<commit_message>
try create gabor by gauss * sin
</commit_message>
<xml_diff>
--- a/scripts/Ohki2020/GaborWavelet/grating/gabor static grating mwork.pptx
+++ b/scripts/Ohki2020/GaborWavelet/grating/gabor static grating mwork.pptx
@@ -344,7 +344,7 @@
           <a:p>
             <a:fld id="{096C1E6D-5458-40A7-B0C2-55AD65E7ECE3}" type="datetimeFigureOut">
               <a:rPr lang="en-US" smtClean="0"/>
-              <a:t>4/25/2021</a:t>
+              <a:t>6/16/2022</a:t>
             </a:fld>
             <a:endParaRPr lang="en-US"/>
           </a:p>
@@ -542,7 +542,7 @@
           <a:p>
             <a:fld id="{096C1E6D-5458-40A7-B0C2-55AD65E7ECE3}" type="datetimeFigureOut">
               <a:rPr lang="en-US" smtClean="0"/>
-              <a:t>4/25/2021</a:t>
+              <a:t>6/16/2022</a:t>
             </a:fld>
             <a:endParaRPr lang="en-US"/>
           </a:p>
@@ -750,7 +750,7 @@
           <a:p>
             <a:fld id="{096C1E6D-5458-40A7-B0C2-55AD65E7ECE3}" type="datetimeFigureOut">
               <a:rPr lang="en-US" smtClean="0"/>
-              <a:t>4/25/2021</a:t>
+              <a:t>6/16/2022</a:t>
             </a:fld>
             <a:endParaRPr lang="en-US"/>
           </a:p>
@@ -948,7 +948,7 @@
           <a:p>
             <a:fld id="{096C1E6D-5458-40A7-B0C2-55AD65E7ECE3}" type="datetimeFigureOut">
               <a:rPr lang="en-US" smtClean="0"/>
-              <a:t>4/25/2021</a:t>
+              <a:t>6/16/2022</a:t>
             </a:fld>
             <a:endParaRPr lang="en-US"/>
           </a:p>
@@ -1223,7 +1223,7 @@
           <a:p>
             <a:fld id="{096C1E6D-5458-40A7-B0C2-55AD65E7ECE3}" type="datetimeFigureOut">
               <a:rPr lang="en-US" smtClean="0"/>
-              <a:t>4/25/2021</a:t>
+              <a:t>6/16/2022</a:t>
             </a:fld>
             <a:endParaRPr lang="en-US"/>
           </a:p>
@@ -1488,7 +1488,7 @@
           <a:p>
             <a:fld id="{096C1E6D-5458-40A7-B0C2-55AD65E7ECE3}" type="datetimeFigureOut">
               <a:rPr lang="en-US" smtClean="0"/>
-              <a:t>4/25/2021</a:t>
+              <a:t>6/16/2022</a:t>
             </a:fld>
             <a:endParaRPr lang="en-US"/>
           </a:p>
@@ -1900,7 +1900,7 @@
           <a:p>
             <a:fld id="{096C1E6D-5458-40A7-B0C2-55AD65E7ECE3}" type="datetimeFigureOut">
               <a:rPr lang="en-US" smtClean="0"/>
-              <a:t>4/25/2021</a:t>
+              <a:t>6/16/2022</a:t>
             </a:fld>
             <a:endParaRPr lang="en-US"/>
           </a:p>
@@ -2041,7 +2041,7 @@
           <a:p>
             <a:fld id="{096C1E6D-5458-40A7-B0C2-55AD65E7ECE3}" type="datetimeFigureOut">
               <a:rPr lang="en-US" smtClean="0"/>
-              <a:t>4/25/2021</a:t>
+              <a:t>6/16/2022</a:t>
             </a:fld>
             <a:endParaRPr lang="en-US"/>
           </a:p>
@@ -2154,7 +2154,7 @@
           <a:p>
             <a:fld id="{096C1E6D-5458-40A7-B0C2-55AD65E7ECE3}" type="datetimeFigureOut">
               <a:rPr lang="en-US" smtClean="0"/>
-              <a:t>4/25/2021</a:t>
+              <a:t>6/16/2022</a:t>
             </a:fld>
             <a:endParaRPr lang="en-US"/>
           </a:p>
@@ -2465,7 +2465,7 @@
           <a:p>
             <a:fld id="{096C1E6D-5458-40A7-B0C2-55AD65E7ECE3}" type="datetimeFigureOut">
               <a:rPr lang="en-US" smtClean="0"/>
-              <a:t>4/25/2021</a:t>
+              <a:t>6/16/2022</a:t>
             </a:fld>
             <a:endParaRPr lang="en-US"/>
           </a:p>
@@ -2753,7 +2753,7 @@
           <a:p>
             <a:fld id="{096C1E6D-5458-40A7-B0C2-55AD65E7ECE3}" type="datetimeFigureOut">
               <a:rPr lang="en-US" smtClean="0"/>
-              <a:t>4/25/2021</a:t>
+              <a:t>6/16/2022</a:t>
             </a:fld>
             <a:endParaRPr lang="en-US"/>
           </a:p>
@@ -2994,7 +2994,7 @@
           <a:p>
             <a:fld id="{096C1E6D-5458-40A7-B0C2-55AD65E7ECE3}" type="datetimeFigureOut">
               <a:rPr lang="en-US" smtClean="0"/>
-              <a:t>4/25/2021</a:t>
+              <a:t>6/16/2022</a:t>
             </a:fld>
             <a:endParaRPr lang="en-US"/>
           </a:p>

</xml_diff>